<commit_message>
3 adult and one more 2.5 year old
</commit_message>
<xml_diff>
--- a/project_3/Presentation/Apply Text Classification as a Keyword Strategy for.pptx
+++ b/project_3/Presentation/Apply Text Classification as a Keyword Strategy for.pptx
@@ -120,6 +120,11 @@
       </a:defRPr>
     </a:lvl9pPr>
   </p:defaultTextStyle>
+  <p:extLst>
+    <p:ext uri="{EFAFB233-063F-42B5-8137-9DF3F51BA10A}">
+      <p15:sldGuideLst xmlns:p15="http://schemas.microsoft.com/office/powerpoint/2012/main"/>
+    </p:ext>
+  </p:extLst>
 </p:presentation>
 </file>
 
@@ -3944,7 +3949,7 @@
               <a:rPr lang="en-US" sz="6000" i="0" dirty="0">
                 <a:effectLst/>
               </a:rPr>
-              <a:t>Apply Text Classification as a Keyword Strategy for </a:t>
+              <a:t>Using Text Classification as a Keyword Strategy for </a:t>
             </a:r>
             <a:br>
               <a:rPr lang="en-US" sz="6000" i="0" dirty="0">
@@ -3955,7 +3960,7 @@
               <a:rPr lang="en-US" sz="6000" i="0" dirty="0">
                 <a:effectLst/>
               </a:rPr>
-              <a:t>Advanced SEO</a:t>
+              <a:t>SEO</a:t>
             </a:r>
             <a:endParaRPr lang="en-SG" sz="6000" dirty="0"/>
           </a:p>
@@ -3995,7 +4000,7 @@
                   <a:schemeClr val="tx1"/>
                 </a:solidFill>
               </a:rPr>
-              <a:t>Roy Ng</a:t>
+              <a:t>Ng Zeng Di</a:t>
             </a:r>
           </a:p>
           <a:p>
@@ -4691,6 +4696,11 @@
             <a:off x="7619094" y="1253331"/>
             <a:ext cx="3412334" cy="4351337"/>
           </a:xfrm>
+          <a:solidFill>
+            <a:schemeClr val="bg1">
+              <a:lumMod val="95000"/>
+            </a:schemeClr>
+          </a:solidFill>
         </p:spPr>
         <p:txBody>
           <a:bodyPr>
@@ -4918,15 +4928,7 @@
             <a:pPr lvl="1"/>
             <a:r>
               <a:rPr lang="en-US" sz="2400" dirty="0"/>
-              <a:t>Pull data from </a:t>
-            </a:r>
-            <a:r>
-              <a:rPr lang="en-US" sz="2400" dirty="0" err="1"/>
-              <a:t>qoura</a:t>
-            </a:r>
-            <a:r>
-              <a:rPr lang="en-US" sz="2400" dirty="0"/>
-              <a:t> as well to increase the training data</a:t>
+              <a:t>Pull data from Quora as well to increase the training data</a:t>
             </a:r>
           </a:p>
           <a:p>
@@ -5070,15 +5072,8 @@
           <a:p>
             <a:r>
               <a:rPr lang="en-US" sz="2800" dirty="0"/>
-              <a:t>One of the plan is displaying on search through SEO</a:t>
-            </a:r>
-          </a:p>
-          <a:p>
-            <a:r>
-              <a:rPr lang="en-US" sz="2800" dirty="0"/>
-              <a:t>Need to identify keywords that are uncommon and would cost lesser per click</a:t>
-            </a:r>
-            <a:endParaRPr lang="en-SG" sz="2800" dirty="0"/>
+              <a:t>Research long-tail keyword opportunities, target low-competition keywords with high conversion rates</a:t>
+            </a:r>
           </a:p>
         </p:txBody>
       </p:sp>
@@ -5679,7 +5674,7 @@
           <a:p>
             <a:r>
               <a:rPr lang="en-US" sz="2800" dirty="0"/>
-              <a:t>We will be using supervised learning technique so we’ll need some labeled data to train our mode. </a:t>
+              <a:t>We will be using supervised learning technique so we’ll need some labeled data to train our model. </a:t>
             </a:r>
             <a:endParaRPr lang="en-SG" sz="2800" dirty="0"/>
           </a:p>
@@ -6187,7 +6182,7 @@
         </p:nvSpPr>
         <p:spPr>
           <a:xfrm>
-            <a:off x="544779" y="5491480"/>
+            <a:off x="544779" y="5881895"/>
             <a:ext cx="8595360" cy="680720"/>
           </a:xfrm>
         </p:spPr>
@@ -6259,7 +6254,7 @@
         </p:blipFill>
         <p:spPr>
           <a:xfrm>
-            <a:off x="544779" y="732580"/>
+            <a:off x="647520" y="475726"/>
             <a:ext cx="10385349" cy="4624817"/>
           </a:xfrm>
           <a:prstGeom prst="rect">
@@ -6272,6 +6267,114 @@
           </a:ln>
         </p:spPr>
       </p:pic>
+      <p:sp>
+        <p:nvSpPr>
+          <p:cNvPr id="7" name="TextBox 6">
+            <a:extLst>
+              <a:ext uri="{FF2B5EF4-FFF2-40B4-BE49-F238E27FC236}">
+                <a16:creationId xmlns:a16="http://schemas.microsoft.com/office/drawing/2014/main" id="{05DF9DE8-5890-6109-E1CE-EF3CAFAEF575}"/>
+              </a:ext>
+            </a:extLst>
+          </p:cNvPr>
+          <p:cNvSpPr txBox="1"/>
+          <p:nvPr/>
+        </p:nvSpPr>
+        <p:spPr>
+          <a:xfrm>
+            <a:off x="5373382" y="5075436"/>
+            <a:ext cx="1705510" cy="369332"/>
+          </a:xfrm>
+          <a:prstGeom prst="rect">
+            <a:avLst/>
+          </a:prstGeom>
+          <a:noFill/>
+        </p:spPr>
+        <p:txBody>
+          <a:bodyPr wrap="square" rtlCol="0">
+            <a:spAutoFit/>
+          </a:bodyPr>
+          <a:lstStyle/>
+          <a:p>
+            <a:r>
+              <a:rPr lang="en-US" dirty="0"/>
+              <a:t>Year</a:t>
+            </a:r>
+            <a:endParaRPr lang="en-SG" dirty="0"/>
+          </a:p>
+        </p:txBody>
+      </p:sp>
+      <p:sp>
+        <p:nvSpPr>
+          <p:cNvPr id="8" name="TextBox 7">
+            <a:extLst>
+              <a:ext uri="{FF2B5EF4-FFF2-40B4-BE49-F238E27FC236}">
+                <a16:creationId xmlns:a16="http://schemas.microsoft.com/office/drawing/2014/main" id="{0B2B8B50-B53C-54A1-6456-0A47A13FF864}"/>
+              </a:ext>
+            </a:extLst>
+          </p:cNvPr>
+          <p:cNvSpPr txBox="1"/>
+          <p:nvPr/>
+        </p:nvSpPr>
+        <p:spPr>
+          <a:xfrm rot="16200000">
+            <a:off x="-282560" y="2664805"/>
+            <a:ext cx="2229493" cy="369332"/>
+          </a:xfrm>
+          <a:prstGeom prst="rect">
+            <a:avLst/>
+          </a:prstGeom>
+          <a:noFill/>
+        </p:spPr>
+        <p:txBody>
+          <a:bodyPr wrap="square" rtlCol="0">
+            <a:spAutoFit/>
+          </a:bodyPr>
+          <a:lstStyle/>
+          <a:p>
+            <a:r>
+              <a:rPr lang="en-US" dirty="0"/>
+              <a:t>Number of posts</a:t>
+            </a:r>
+            <a:endParaRPr lang="en-SG" dirty="0"/>
+          </a:p>
+        </p:txBody>
+      </p:sp>
+      <p:sp>
+        <p:nvSpPr>
+          <p:cNvPr id="9" name="TextBox 8">
+            <a:extLst>
+              <a:ext uri="{FF2B5EF4-FFF2-40B4-BE49-F238E27FC236}">
+                <a16:creationId xmlns:a16="http://schemas.microsoft.com/office/drawing/2014/main" id="{D4E055AA-F6A8-5654-E140-0815F8077F05}"/>
+              </a:ext>
+            </a:extLst>
+          </p:cNvPr>
+          <p:cNvSpPr txBox="1"/>
+          <p:nvPr/>
+        </p:nvSpPr>
+        <p:spPr>
+          <a:xfrm rot="16200000">
+            <a:off x="4725448" y="2442714"/>
+            <a:ext cx="2229493" cy="369332"/>
+          </a:xfrm>
+          <a:prstGeom prst="rect">
+            <a:avLst/>
+          </a:prstGeom>
+          <a:noFill/>
+        </p:spPr>
+        <p:txBody>
+          <a:bodyPr wrap="square" rtlCol="0">
+            <a:spAutoFit/>
+          </a:bodyPr>
+          <a:lstStyle/>
+          <a:p>
+            <a:r>
+              <a:rPr lang="en-US" dirty="0"/>
+              <a:t>Number of posts</a:t>
+            </a:r>
+            <a:endParaRPr lang="en-SG" dirty="0"/>
+          </a:p>
+        </p:txBody>
+      </p:sp>
     </p:spTree>
     <p:extLst>
       <p:ext uri="{BB962C8B-B14F-4D97-AF65-F5344CB8AC3E}">

</xml_diff>